<commit_message>
Update of file Dicas de como fazer tudo no Windows
</commit_message>
<xml_diff>
--- a/Manual/instrucoes_03_2014.pptx
+++ b/Manual/instrucoes_03_2014.pptx
@@ -5,10 +5,10 @@
     <p:sldMasterId id="2147483658" r:id="rId1"/>
   </p:sldMasterIdLst>
   <p:notesMasterIdLst>
-    <p:notesMasterId r:id="rId23"/>
+    <p:notesMasterId r:id="rId20"/>
   </p:notesMasterIdLst>
   <p:handoutMasterIdLst>
-    <p:handoutMasterId r:id="rId24"/>
+    <p:handoutMasterId r:id="rId21"/>
   </p:handoutMasterIdLst>
   <p:sldIdLst>
     <p:sldId id="348" r:id="rId2"/>
@@ -29,9 +29,6 @@
     <p:sldId id="365" r:id="rId17"/>
     <p:sldId id="364" r:id="rId18"/>
     <p:sldId id="363" r:id="rId19"/>
-    <p:sldId id="373" r:id="rId20"/>
-    <p:sldId id="374" r:id="rId21"/>
-    <p:sldId id="375" r:id="rId22"/>
   </p:sldIdLst>
   <p:sldSz cx="9144000" cy="6858000" type="screen4x3"/>
   <p:notesSz cx="7099300" cy="10234613"/>
@@ -1037,7 +1034,7 @@
             <a:fld id="{CC22A2BA-8254-4F47-9E9B-F9F372DCB0AA}" type="datetime1">
               <a:rPr lang="pt-BR"/>
               <a:pPr/>
-              <a:t>06/03/2014</a:t>
+              <a:t>22/05/2014</a:t>
             </a:fld>
             <a:endParaRPr lang="pt-BR"/>
           </a:p>
@@ -1216,7 +1213,7 @@
             <a:fld id="{BAF6F19A-B581-4A9D-852D-C6058614CE72}" type="datetime1">
               <a:rPr lang="pt-BR"/>
               <a:pPr/>
-              <a:t>06/03/2014</a:t>
+              <a:t>22/05/2014</a:t>
             </a:fld>
             <a:endParaRPr lang="pt-BR"/>
           </a:p>
@@ -1405,7 +1402,7 @@
             <a:fld id="{4E498DF0-F207-485C-8466-11ABF1C1E267}" type="datetime1">
               <a:rPr lang="pt-BR"/>
               <a:pPr/>
-              <a:t>06/03/2014</a:t>
+              <a:t>22/05/2014</a:t>
             </a:fld>
             <a:endParaRPr lang="pt-BR"/>
           </a:p>
@@ -1566,7 +1563,7 @@
             <a:fld id="{1F2FEB1B-548F-4803-9D06-B20BE81DAE0F}" type="datetime1">
               <a:rPr lang="pt-BR"/>
               <a:pPr/>
-              <a:t>06/03/2014</a:t>
+              <a:t>22/05/2014</a:t>
             </a:fld>
             <a:endParaRPr lang="pt-BR"/>
           </a:p>
@@ -1884,7 +1881,7 @@
             <a:fld id="{F4311036-2175-4B79-9D14-2AD086383D9B}" type="datetime1">
               <a:rPr lang="pt-BR"/>
               <a:pPr/>
-              <a:t>06/03/2014</a:t>
+              <a:t>22/05/2014</a:t>
             </a:fld>
             <a:endParaRPr lang="pt-BR"/>
           </a:p>
@@ -2073,7 +2070,7 @@
             <a:fld id="{0E286A42-84D9-4671-80D7-7593B3952F5A}" type="datetime1">
               <a:rPr lang="pt-BR"/>
               <a:pPr/>
-              <a:t>06/03/2014</a:t>
+              <a:t>22/05/2014</a:t>
             </a:fld>
             <a:endParaRPr lang="pt-BR"/>
           </a:p>
@@ -2274,7 +2271,7 @@
             <a:fld id="{F31CB871-30E9-4BF1-99FF-5112D8EEB5AB}" type="datetime1">
               <a:rPr lang="pt-BR"/>
               <a:pPr/>
-              <a:t>06/03/2014</a:t>
+              <a:t>22/05/2014</a:t>
             </a:fld>
             <a:endParaRPr lang="pt-BR"/>
           </a:p>
@@ -2571,7 +2568,7 @@
             <a:fld id="{C9AC57E0-7CF7-4D2D-B1E1-ED7B6048941F}" type="datetime1">
               <a:rPr lang="pt-BR"/>
               <a:pPr/>
-              <a:t>06/03/2014</a:t>
+              <a:t>22/05/2014</a:t>
             </a:fld>
             <a:endParaRPr lang="pt-BR"/>
           </a:p>
@@ -3007,7 +3004,7 @@
             <a:fld id="{004C4087-AE3C-4CE3-82BB-5BA8677CEA95}" type="datetime1">
               <a:rPr lang="pt-BR"/>
               <a:pPr/>
-              <a:t>06/03/2014</a:t>
+              <a:t>22/05/2014</a:t>
             </a:fld>
             <a:endParaRPr lang="pt-BR"/>
           </a:p>
@@ -3134,7 +3131,7 @@
             <a:fld id="{D639519A-80EB-4369-90BC-1DF0C634CCC3}" type="datetime1">
               <a:rPr lang="pt-BR"/>
               <a:pPr/>
-              <a:t>06/03/2014</a:t>
+              <a:t>22/05/2014</a:t>
             </a:fld>
             <a:endParaRPr lang="pt-BR"/>
           </a:p>
@@ -3238,7 +3235,7 @@
             <a:fld id="{069344B1-DFF1-4724-9C77-6DF3C8F8DFB0}" type="datetime1">
               <a:rPr lang="pt-BR"/>
               <a:pPr/>
-              <a:t>06/03/2014</a:t>
+              <a:t>22/05/2014</a:t>
             </a:fld>
             <a:endParaRPr lang="pt-BR"/>
           </a:p>
@@ -3524,7 +3521,7 @@
             <a:fld id="{33398B17-8E55-472C-ADF6-F68A42EA017A}" type="datetime1">
               <a:rPr lang="pt-BR"/>
               <a:pPr/>
-              <a:t>06/03/2014</a:t>
+              <a:t>22/05/2014</a:t>
             </a:fld>
             <a:endParaRPr lang="pt-BR"/>
           </a:p>
@@ -3786,7 +3783,7 @@
             <a:fld id="{F1430D0D-7F2D-4321-BA21-C19FCD0B1A67}" type="datetime1">
               <a:rPr lang="pt-BR"/>
               <a:pPr/>
-              <a:t>06/03/2014</a:t>
+              <a:t>22/05/2014</a:t>
             </a:fld>
             <a:endParaRPr lang="pt-BR"/>
           </a:p>
@@ -4039,7 +4036,7 @@
             <a:fld id="{DB9AAD8E-018B-4E8C-9A30-4A7C11783A0C}" type="datetime1">
               <a:rPr lang="pt-BR"/>
               <a:pPr/>
-              <a:t>06/03/2014</a:t>
+              <a:t>22/05/2014</a:t>
             </a:fld>
             <a:endParaRPr lang="pt-BR"/>
           </a:p>
@@ -4685,7 +4682,7 @@
             <a:fld id="{03A4310D-C0AD-465A-8BD7-97F1322DCE15}" type="datetime1">
               <a:rPr lang="pt-BR"/>
               <a:pPr/>
-              <a:t>06/03/2014</a:t>
+              <a:t>22/05/2014</a:t>
             </a:fld>
             <a:endParaRPr lang="pt-BR"/>
           </a:p>
@@ -4759,13 +4756,19 @@
         </p:nvSpPr>
         <p:spPr>
           <a:xfrm>
-            <a:off x="1331913" y="4797425"/>
-            <a:ext cx="6400800" cy="1414463"/>
+            <a:off x="1331913" y="4221089"/>
+            <a:ext cx="6400800" cy="1990800"/>
           </a:xfrm>
         </p:spPr>
         <p:txBody>
           <a:bodyPr/>
           <a:lstStyle/>
+          <a:p>
+            <a:r>
+              <a:rPr lang="en-US" dirty="0" smtClean="0"/>
+              <a:t>Paulo Souza</a:t>
+            </a:r>
+          </a:p>
           <a:p>
             <a:r>
               <a:rPr lang="en-US" dirty="0" err="1" smtClean="0"/>
@@ -4918,7 +4921,7 @@
             <a:fld id="{A5D83A7D-548B-47F1-911E-07560B2171B8}" type="datetime1">
               <a:rPr lang="pt-BR"/>
               <a:pPr/>
-              <a:t>06/03/2014</a:t>
+              <a:t>22/05/2014</a:t>
             </a:fld>
             <a:endParaRPr lang="pt-BR"/>
           </a:p>
@@ -5053,7 +5056,15 @@
             </a:pPr>
             <a:r>
               <a:rPr lang="pt-BR" sz="1600" dirty="0"/>
-              <a:t>	OUTCHAR RX RY	VIDEO(RY)&lt;-CHAR(RX) 	</a:t>
+              <a:t>	OUTCHAR </a:t>
+            </a:r>
+            <a:r>
+              <a:rPr lang="pt-BR" sz="1600" dirty="0" smtClean="0"/>
+              <a:t>RX, </a:t>
+            </a:r>
+            <a:r>
+              <a:rPr lang="pt-BR" sz="1600" dirty="0"/>
+              <a:t>RY	VIDEO(RY)&lt;-CHAR(RX) 	</a:t>
             </a:r>
             <a:r>
               <a:rPr lang="pt-BR" sz="1600" dirty="0" smtClean="0"/>
@@ -5162,7 +5173,7 @@
             <a:fld id="{8E9BCB67-FD7E-42A2-B458-F658D16F45B7}" type="datetime1">
               <a:rPr lang="pt-BR"/>
               <a:pPr/>
-              <a:t>06/03/2014</a:t>
+              <a:t>22/05/2014</a:t>
             </a:fld>
             <a:endParaRPr lang="pt-BR"/>
           </a:p>
@@ -5980,7 +5991,7 @@
             <a:fld id="{3FFEB61D-F580-47E1-976C-DA73DE3839C2}" type="datetime1">
               <a:rPr lang="pt-BR"/>
               <a:pPr/>
-              <a:t>06/03/2014</a:t>
+              <a:t>22/05/2014</a:t>
             </a:fld>
             <a:endParaRPr lang="pt-BR"/>
           </a:p>
@@ -6779,7 +6790,7 @@
             <a:fld id="{008D1F6E-69CE-4289-AB5F-11146AEC2EE7}" type="datetime1">
               <a:rPr lang="pt-BR"/>
               <a:pPr/>
-              <a:t>06/03/2014</a:t>
+              <a:t>22/05/2014</a:t>
             </a:fld>
             <a:endParaRPr lang="pt-BR"/>
           </a:p>
@@ -7769,7 +7780,7 @@
             <a:fld id="{D28A8DCF-6292-4452-AAF1-B37357C9DFD5}" type="datetime1">
               <a:rPr lang="pt-BR"/>
               <a:pPr/>
-              <a:t>06/03/2014</a:t>
+              <a:t>22/05/2014</a:t>
             </a:fld>
             <a:endParaRPr lang="pt-BR"/>
           </a:p>
@@ -8068,7 +8079,7 @@
             <a:fld id="{3E6961BA-EB93-446C-848A-D00097A7ED58}" type="datetime1">
               <a:rPr lang="pt-BR"/>
               <a:pPr/>
-              <a:t>06/03/2014</a:t>
+              <a:t>22/05/2014</a:t>
             </a:fld>
             <a:endParaRPr lang="pt-BR"/>
           </a:p>
@@ -8759,7 +8770,7 @@
             <a:fld id="{75984E8C-8BAA-49D5-95C8-F19C2DD78E4E}" type="datetime1">
               <a:rPr lang="pt-BR"/>
               <a:pPr/>
-              <a:t>06/03/2014</a:t>
+              <a:t>22/05/2014</a:t>
             </a:fld>
             <a:endParaRPr lang="pt-BR"/>
           </a:p>
@@ -9166,7 +9177,7 @@
             <a:fld id="{8A950CF1-BF96-4DA8-8313-BFE004E712D7}" type="datetime1">
               <a:rPr lang="pt-BR"/>
               <a:pPr/>
-              <a:t>06/03/2014</a:t>
+              <a:t>22/05/2014</a:t>
             </a:fld>
             <a:endParaRPr lang="pt-BR"/>
           </a:p>
@@ -9746,7 +9757,7 @@
             <a:fld id="{4238A551-5A9D-425A-8DF1-46826E2F3B58}" type="datetime1">
               <a:rPr lang="pt-BR"/>
               <a:pPr/>
-              <a:t>06/03/2014</a:t>
+              <a:t>22/05/2014</a:t>
             </a:fld>
             <a:endParaRPr lang="pt-BR"/>
           </a:p>
@@ -10029,179 +10040,6 @@
               <a:spcBef>
                 <a:spcPct val="20000"/>
               </a:spcBef>
-            </a:pPr>
-            <a:endParaRPr lang="pt-BR" sz="1600" dirty="0"/>
-          </a:p>
-        </p:txBody>
-      </p:sp>
-    </p:spTree>
-  </p:cSld>
-  <p:clrMapOvr>
-    <a:masterClrMapping/>
-  </p:clrMapOvr>
-  <p:timing>
-    <p:tnLst>
-      <p:par>
-        <p:cTn id="1" dur="indefinite" restart="never" nodeType="tmRoot"/>
-      </p:par>
-    </p:tnLst>
-  </p:timing>
-</p:sld>
-</file>
-
-<file path=ppt/slides/slide19.xml><?xml version="1.0" encoding="utf-8"?>
-<p:sld xmlns:a="http://schemas.openxmlformats.org/drawingml/2006/main" xmlns:r="http://schemas.openxmlformats.org/officeDocument/2006/relationships" xmlns:p="http://schemas.openxmlformats.org/presentationml/2006/main">
-  <p:cSld>
-    <p:spTree>
-      <p:nvGrpSpPr>
-        <p:cNvPr id="1" name=""/>
-        <p:cNvGrpSpPr/>
-        <p:nvPr/>
-      </p:nvGrpSpPr>
-      <p:grpSpPr>
-        <a:xfrm>
-          <a:off x="0" y="0"/>
-          <a:ext cx="0" cy="0"/>
-          <a:chOff x="0" y="0"/>
-          <a:chExt cx="0" cy="0"/>
-        </a:xfrm>
-      </p:grpSpPr>
-      <p:sp>
-        <p:nvSpPr>
-          <p:cNvPr id="4" name="Espaço Reservado para Data 3"/>
-          <p:cNvSpPr>
-            <a:spLocks noGrp="1"/>
-          </p:cNvSpPr>
-          <p:nvPr>
-            <p:ph type="dt" sz="half" idx="10"/>
-          </p:nvPr>
-        </p:nvSpPr>
-        <p:spPr/>
-        <p:txBody>
-          <a:bodyPr/>
-          <a:lstStyle/>
-          <a:p>
-            <a:fld id="{4238A551-5A9D-425A-8DF1-46826E2F3B58}" type="datetime1">
-              <a:rPr lang="pt-BR"/>
-              <a:pPr/>
-              <a:t>06/03/2014</a:t>
-            </a:fld>
-            <a:endParaRPr lang="pt-BR"/>
-          </a:p>
-        </p:txBody>
-      </p:sp>
-      <p:sp>
-        <p:nvSpPr>
-          <p:cNvPr id="6" name="Espaço Reservado para Número de Slide 5"/>
-          <p:cNvSpPr>
-            <a:spLocks noGrp="1"/>
-          </p:cNvSpPr>
-          <p:nvPr>
-            <p:ph type="sldNum" sz="quarter" idx="12"/>
-          </p:nvPr>
-        </p:nvSpPr>
-        <p:spPr/>
-        <p:txBody>
-          <a:bodyPr/>
-          <a:lstStyle/>
-          <a:p>
-            <a:fld id="{35D1DE20-26E1-4E0C-8911-C747C9DAA4F5}" type="slidenum">
-              <a:rPr lang="pt-BR"/>
-              <a:pPr/>
-              <a:t>19</a:t>
-            </a:fld>
-            <a:endParaRPr lang="pt-BR"/>
-          </a:p>
-        </p:txBody>
-      </p:sp>
-      <p:sp>
-        <p:nvSpPr>
-          <p:cNvPr id="671746" name="Rectangle 2"/>
-          <p:cNvSpPr>
-            <a:spLocks noGrp="1" noChangeArrowheads="1"/>
-          </p:cNvSpPr>
-          <p:nvPr>
-            <p:ph type="title"/>
-          </p:nvPr>
-        </p:nvSpPr>
-        <p:spPr/>
-        <p:txBody>
-          <a:bodyPr/>
-          <a:lstStyle/>
-          <a:p>
-            <a:r>
-              <a:rPr lang="pt-BR" dirty="0"/>
-              <a:t>Instruções </a:t>
-            </a:r>
-            <a:r>
-              <a:rPr lang="pt-BR" dirty="0" smtClean="0"/>
-              <a:t>para arrumar no montador</a:t>
-            </a:r>
-            <a:endParaRPr lang="pt-BR" dirty="0"/>
-          </a:p>
-        </p:txBody>
-      </p:sp>
-      <p:sp>
-        <p:nvSpPr>
-          <p:cNvPr id="671747" name="Rectangle 3"/>
-          <p:cNvSpPr>
-            <a:spLocks noChangeArrowheads="1"/>
-          </p:cNvSpPr>
-          <p:nvPr/>
-        </p:nvSpPr>
-        <p:spPr bwMode="auto">
-          <a:xfrm>
-            <a:off x="684213" y="1557338"/>
-            <a:ext cx="8229600" cy="4895850"/>
-          </a:xfrm>
-          <a:prstGeom prst="rect">
-            <a:avLst/>
-          </a:prstGeom>
-          <a:noFill/>
-          <a:ln w="9525">
-            <a:noFill/>
-            <a:miter lim="800000"/>
-            <a:headEnd/>
-            <a:tailEnd/>
-          </a:ln>
-          <a:effectLst/>
-        </p:spPr>
-        <p:txBody>
-          <a:bodyPr/>
-          <a:lstStyle/>
-          <a:p>
-            <a:pPr>
-              <a:buNone/>
-            </a:pPr>
-            <a:r>
-              <a:rPr lang="en-US" sz="1600" dirty="0" smtClean="0"/>
-              <a:t>	</a:t>
-            </a:r>
-          </a:p>
-          <a:p>
-            <a:pPr>
-              <a:buFontTx/>
-              <a:buNone/>
-            </a:pPr>
-            <a:r>
-              <a:rPr lang="en-US" sz="1600" dirty="0" smtClean="0"/>
-              <a:t>		</a:t>
-            </a:r>
-          </a:p>
-          <a:p>
-            <a:pPr>
-              <a:buFontTx/>
-              <a:buNone/>
-            </a:pPr>
-            <a:r>
-              <a:rPr lang="en-US" sz="1600" dirty="0" smtClean="0"/>
-              <a:t>	</a:t>
-            </a:r>
-          </a:p>
-          <a:p>
-            <a:pPr>
-              <a:buFontTx/>
-              <a:buNone/>
             </a:pPr>
             <a:endParaRPr lang="pt-BR" sz="1600" dirty="0"/>
           </a:p>
@@ -15727,540 +15565,6 @@
 </p:sld>
 </file>
 
-<file path=ppt/slides/slide20.xml><?xml version="1.0" encoding="utf-8"?>
-<p:sld xmlns:a="http://schemas.openxmlformats.org/drawingml/2006/main" xmlns:r="http://schemas.openxmlformats.org/officeDocument/2006/relationships" xmlns:p="http://schemas.openxmlformats.org/presentationml/2006/main">
-  <p:cSld>
-    <p:spTree>
-      <p:nvGrpSpPr>
-        <p:cNvPr id="1" name=""/>
-        <p:cNvGrpSpPr/>
-        <p:nvPr/>
-      </p:nvGrpSpPr>
-      <p:grpSpPr>
-        <a:xfrm>
-          <a:off x="0" y="0"/>
-          <a:ext cx="0" cy="0"/>
-          <a:chOff x="0" y="0"/>
-          <a:chExt cx="0" cy="0"/>
-        </a:xfrm>
-      </p:grpSpPr>
-      <p:sp>
-        <p:nvSpPr>
-          <p:cNvPr id="4" name="Espaço Reservado para Data 3"/>
-          <p:cNvSpPr>
-            <a:spLocks noGrp="1"/>
-          </p:cNvSpPr>
-          <p:nvPr>
-            <p:ph type="dt" sz="half" idx="10"/>
-          </p:nvPr>
-        </p:nvSpPr>
-        <p:spPr/>
-        <p:txBody>
-          <a:bodyPr/>
-          <a:lstStyle/>
-          <a:p>
-            <a:fld id="{4238A551-5A9D-425A-8DF1-46826E2F3B58}" type="datetime1">
-              <a:rPr lang="pt-BR"/>
-              <a:pPr/>
-              <a:t>06/03/2014</a:t>
-            </a:fld>
-            <a:endParaRPr lang="pt-BR"/>
-          </a:p>
-        </p:txBody>
-      </p:sp>
-      <p:sp>
-        <p:nvSpPr>
-          <p:cNvPr id="6" name="Espaço Reservado para Número de Slide 5"/>
-          <p:cNvSpPr>
-            <a:spLocks noGrp="1"/>
-          </p:cNvSpPr>
-          <p:nvPr>
-            <p:ph type="sldNum" sz="quarter" idx="12"/>
-          </p:nvPr>
-        </p:nvSpPr>
-        <p:spPr/>
-        <p:txBody>
-          <a:bodyPr/>
-          <a:lstStyle/>
-          <a:p>
-            <a:fld id="{35D1DE20-26E1-4E0C-8911-C747C9DAA4F5}" type="slidenum">
-              <a:rPr lang="pt-BR"/>
-              <a:pPr/>
-              <a:t>20</a:t>
-            </a:fld>
-            <a:endParaRPr lang="pt-BR"/>
-          </a:p>
-        </p:txBody>
-      </p:sp>
-      <p:sp>
-        <p:nvSpPr>
-          <p:cNvPr id="671746" name="Rectangle 2"/>
-          <p:cNvSpPr>
-            <a:spLocks noGrp="1" noChangeArrowheads="1"/>
-          </p:cNvSpPr>
-          <p:nvPr>
-            <p:ph type="title"/>
-          </p:nvPr>
-        </p:nvSpPr>
-        <p:spPr/>
-        <p:txBody>
-          <a:bodyPr/>
-          <a:lstStyle/>
-          <a:p>
-            <a:r>
-              <a:rPr lang="pt-BR" dirty="0"/>
-              <a:t>Instruções </a:t>
-            </a:r>
-            <a:r>
-              <a:rPr lang="pt-BR" dirty="0" smtClean="0"/>
-              <a:t>para arrumar na CPU</a:t>
-            </a:r>
-            <a:endParaRPr lang="pt-BR" dirty="0"/>
-          </a:p>
-        </p:txBody>
-      </p:sp>
-      <p:sp>
-        <p:nvSpPr>
-          <p:cNvPr id="671747" name="Rectangle 3"/>
-          <p:cNvSpPr>
-            <a:spLocks noChangeArrowheads="1"/>
-          </p:cNvSpPr>
-          <p:nvPr/>
-        </p:nvSpPr>
-        <p:spPr bwMode="auto">
-          <a:xfrm>
-            <a:off x="684213" y="1557338"/>
-            <a:ext cx="8229600" cy="4895850"/>
-          </a:xfrm>
-          <a:prstGeom prst="rect">
-            <a:avLst/>
-          </a:prstGeom>
-          <a:noFill/>
-          <a:ln w="9525">
-            <a:noFill/>
-            <a:miter lim="800000"/>
-            <a:headEnd/>
-            <a:tailEnd/>
-          </a:ln>
-          <a:effectLst/>
-        </p:spPr>
-        <p:txBody>
-          <a:bodyPr/>
-          <a:lstStyle/>
-          <a:p>
-            <a:pPr>
-              <a:buFontTx/>
-              <a:buNone/>
-            </a:pPr>
-            <a:r>
-              <a:rPr lang="en-US" sz="1800" dirty="0" smtClean="0"/>
-              <a:t>	</a:t>
-            </a:r>
-            <a:endParaRPr lang="en-US" sz="1600" dirty="0" smtClean="0"/>
-          </a:p>
-          <a:p>
-            <a:pPr>
-              <a:buFontTx/>
-              <a:buNone/>
-            </a:pPr>
-            <a:r>
-              <a:rPr lang="en-US" sz="1600" dirty="0" smtClean="0"/>
-              <a:t>	</a:t>
-            </a:r>
-          </a:p>
-          <a:p>
-            <a:pPr>
-              <a:buFontTx/>
-              <a:buNone/>
-            </a:pPr>
-            <a:r>
-              <a:rPr lang="en-US" sz="1600" dirty="0" smtClean="0"/>
-              <a:t>	</a:t>
-            </a:r>
-            <a:endParaRPr lang="pt-BR" sz="1600" dirty="0"/>
-          </a:p>
-        </p:txBody>
-      </p:sp>
-    </p:spTree>
-  </p:cSld>
-  <p:clrMapOvr>
-    <a:masterClrMapping/>
-  </p:clrMapOvr>
-  <p:timing>
-    <p:tnLst>
-      <p:par>
-        <p:cTn id="1" dur="indefinite" restart="never" nodeType="tmRoot"/>
-      </p:par>
-    </p:tnLst>
-  </p:timing>
-</p:sld>
-</file>
-
-<file path=ppt/slides/slide21.xml><?xml version="1.0" encoding="utf-8"?>
-<p:sld xmlns:a="http://schemas.openxmlformats.org/drawingml/2006/main" xmlns:r="http://schemas.openxmlformats.org/officeDocument/2006/relationships" xmlns:p="http://schemas.openxmlformats.org/presentationml/2006/main">
-  <p:cSld>
-    <p:spTree>
-      <p:nvGrpSpPr>
-        <p:cNvPr id="1" name=""/>
-        <p:cNvGrpSpPr/>
-        <p:nvPr/>
-      </p:nvGrpSpPr>
-      <p:grpSpPr>
-        <a:xfrm>
-          <a:off x="0" y="0"/>
-          <a:ext cx="0" cy="0"/>
-          <a:chOff x="0" y="0"/>
-          <a:chExt cx="0" cy="0"/>
-        </a:xfrm>
-      </p:grpSpPr>
-      <p:sp>
-        <p:nvSpPr>
-          <p:cNvPr id="4" name="Espaço Reservado para Data 3"/>
-          <p:cNvSpPr>
-            <a:spLocks noGrp="1"/>
-          </p:cNvSpPr>
-          <p:nvPr>
-            <p:ph type="dt" sz="half" idx="10"/>
-          </p:nvPr>
-        </p:nvSpPr>
-        <p:spPr/>
-        <p:txBody>
-          <a:bodyPr/>
-          <a:lstStyle/>
-          <a:p>
-            <a:fld id="{4238A551-5A9D-425A-8DF1-46826E2F3B58}" type="datetime1">
-              <a:rPr lang="pt-BR"/>
-              <a:pPr/>
-              <a:t>06/03/2014</a:t>
-            </a:fld>
-            <a:endParaRPr lang="pt-BR"/>
-          </a:p>
-        </p:txBody>
-      </p:sp>
-      <p:sp>
-        <p:nvSpPr>
-          <p:cNvPr id="6" name="Espaço Reservado para Número de Slide 5"/>
-          <p:cNvSpPr>
-            <a:spLocks noGrp="1"/>
-          </p:cNvSpPr>
-          <p:nvPr>
-            <p:ph type="sldNum" sz="quarter" idx="12"/>
-          </p:nvPr>
-        </p:nvSpPr>
-        <p:spPr/>
-        <p:txBody>
-          <a:bodyPr/>
-          <a:lstStyle/>
-          <a:p>
-            <a:fld id="{35D1DE20-26E1-4E0C-8911-C747C9DAA4F5}" type="slidenum">
-              <a:rPr lang="pt-BR"/>
-              <a:pPr/>
-              <a:t>21</a:t>
-            </a:fld>
-            <a:endParaRPr lang="pt-BR"/>
-          </a:p>
-        </p:txBody>
-      </p:sp>
-      <p:sp>
-        <p:nvSpPr>
-          <p:cNvPr id="671746" name="Rectangle 2"/>
-          <p:cNvSpPr>
-            <a:spLocks noGrp="1" noChangeArrowheads="1"/>
-          </p:cNvSpPr>
-          <p:nvPr>
-            <p:ph type="title"/>
-          </p:nvPr>
-        </p:nvSpPr>
-        <p:spPr/>
-        <p:txBody>
-          <a:bodyPr/>
-          <a:lstStyle/>
-          <a:p>
-            <a:r>
-              <a:rPr lang="pt-BR" dirty="0"/>
-              <a:t>Instruções </a:t>
-            </a:r>
-            <a:r>
-              <a:rPr lang="pt-BR" dirty="0" smtClean="0"/>
-              <a:t>para arrumar no simulador</a:t>
-            </a:r>
-            <a:endParaRPr lang="pt-BR" dirty="0"/>
-          </a:p>
-        </p:txBody>
-      </p:sp>
-      <p:sp>
-        <p:nvSpPr>
-          <p:cNvPr id="671747" name="Rectangle 3"/>
-          <p:cNvSpPr>
-            <a:spLocks noChangeArrowheads="1"/>
-          </p:cNvSpPr>
-          <p:nvPr/>
-        </p:nvSpPr>
-        <p:spPr bwMode="auto">
-          <a:xfrm>
-            <a:off x="684213" y="1557338"/>
-            <a:ext cx="8229600" cy="4895850"/>
-          </a:xfrm>
-          <a:prstGeom prst="rect">
-            <a:avLst/>
-          </a:prstGeom>
-          <a:noFill/>
-          <a:ln w="9525">
-            <a:noFill/>
-            <a:miter lim="800000"/>
-            <a:headEnd/>
-            <a:tailEnd/>
-          </a:ln>
-          <a:effectLst/>
-        </p:spPr>
-        <p:txBody>
-          <a:bodyPr/>
-          <a:lstStyle/>
-          <a:p>
-            <a:pPr>
-              <a:buNone/>
-            </a:pPr>
-            <a:r>
-              <a:rPr lang="en-US" sz="1600" dirty="0" smtClean="0"/>
-              <a:t>	</a:t>
-            </a:r>
-          </a:p>
-          <a:p>
-            <a:pPr>
-              <a:buFontTx/>
-              <a:buNone/>
-            </a:pPr>
-            <a:r>
-              <a:rPr lang="en-US" sz="1600" dirty="0" smtClean="0"/>
-              <a:t>	MOV RX SP</a:t>
-            </a:r>
-          </a:p>
-          <a:p>
-            <a:pPr>
-              <a:buFontTx/>
-              <a:buNone/>
-            </a:pPr>
-            <a:r>
-              <a:rPr lang="en-US" sz="1600" dirty="0" smtClean="0"/>
-              <a:t>	MOV SP RX</a:t>
-            </a:r>
-          </a:p>
-          <a:p>
-            <a:pPr>
-              <a:buFontTx/>
-              <a:buNone/>
-            </a:pPr>
-            <a:endParaRPr lang="en-US" sz="1600" dirty="0" smtClean="0"/>
-          </a:p>
-          <a:p>
-            <a:pPr>
-              <a:buFontTx/>
-              <a:buNone/>
-            </a:pPr>
-            <a:r>
-              <a:rPr lang="en-US" sz="1600" dirty="0" smtClean="0"/>
-              <a:t>HOME</a:t>
-            </a:r>
-          </a:p>
-          <a:p>
-            <a:pPr>
-              <a:buFontTx/>
-              <a:buNone/>
-            </a:pPr>
-            <a:endParaRPr lang="en-US" sz="1600" dirty="0" smtClean="0"/>
-          </a:p>
-          <a:p>
-            <a:pPr>
-              <a:buFontTx/>
-              <a:buNone/>
-            </a:pPr>
-            <a:endParaRPr lang="en-US" sz="1600" dirty="0" smtClean="0"/>
-          </a:p>
-          <a:p>
-            <a:pPr>
-              <a:buFontTx/>
-              <a:buNone/>
-            </a:pPr>
-            <a:endParaRPr lang="en-US" sz="1600" dirty="0" smtClean="0"/>
-          </a:p>
-          <a:p>
-            <a:pPr>
-              <a:buFontTx/>
-              <a:buNone/>
-            </a:pPr>
-            <a:r>
-              <a:rPr lang="en-US" sz="1600" dirty="0" smtClean="0"/>
-              <a:t>Shift  -&gt;  </a:t>
-            </a:r>
-            <a:r>
-              <a:rPr lang="en-US" sz="1600" dirty="0" err="1" smtClean="0"/>
-              <a:t>rx</a:t>
-            </a:r>
-            <a:r>
-              <a:rPr lang="en-US" sz="1600" dirty="0" smtClean="0"/>
-              <a:t>  </a:t>
-            </a:r>
-            <a:r>
-              <a:rPr lang="en-US" sz="1600" dirty="0" err="1" smtClean="0"/>
-              <a:t>ry</a:t>
-            </a:r>
-            <a:r>
-              <a:rPr lang="en-US" sz="1600" dirty="0" smtClean="0"/>
-              <a:t>!!</a:t>
-            </a:r>
-          </a:p>
-          <a:p>
-            <a:pPr>
-              <a:buFontTx/>
-              <a:buNone/>
-            </a:pPr>
-            <a:endParaRPr lang="en-US" sz="1600" dirty="0" smtClean="0"/>
-          </a:p>
-          <a:p>
-            <a:pPr>
-              <a:buFontTx/>
-              <a:buNone/>
-            </a:pPr>
-            <a:r>
-              <a:rPr lang="en-US" sz="1600" dirty="0" smtClean="0"/>
-              <a:t>Push FR  -&gt; temp = 0;</a:t>
-            </a:r>
-          </a:p>
-          <a:p>
-            <a:pPr>
-              <a:buFontTx/>
-              <a:buNone/>
-            </a:pPr>
-            <a:endParaRPr lang="en-US" sz="1600" dirty="0" smtClean="0"/>
-          </a:p>
-          <a:p>
-            <a:pPr>
-              <a:buFontTx/>
-              <a:buNone/>
-            </a:pPr>
-            <a:r>
-              <a:rPr lang="en-US" sz="1600" dirty="0" err="1" smtClean="0"/>
-              <a:t>Gecth</a:t>
-            </a:r>
-            <a:r>
-              <a:rPr lang="en-US" sz="1600" dirty="0" smtClean="0"/>
-              <a:t>  -&gt; </a:t>
-            </a:r>
-            <a:r>
-              <a:rPr lang="en-US" sz="1600" dirty="0" err="1" smtClean="0"/>
-              <a:t>Limpa</a:t>
-            </a:r>
-            <a:r>
-              <a:rPr lang="en-US" sz="1600" dirty="0" smtClean="0"/>
-              <a:t> o buffer</a:t>
-            </a:r>
-          </a:p>
-          <a:p>
-            <a:pPr>
-              <a:buFontTx/>
-              <a:buNone/>
-            </a:pPr>
-            <a:endParaRPr lang="en-US" sz="1600" dirty="0" smtClean="0"/>
-          </a:p>
-          <a:p>
-            <a:pPr>
-              <a:buFontTx/>
-              <a:buNone/>
-            </a:pPr>
-            <a:r>
-              <a:rPr lang="en-US" sz="1600" dirty="0" err="1" smtClean="0"/>
-              <a:t>Outchar</a:t>
-            </a:r>
-            <a:r>
-              <a:rPr lang="en-US" sz="1600" dirty="0" smtClean="0"/>
-              <a:t> -&gt; </a:t>
-            </a:r>
-            <a:r>
-              <a:rPr lang="en-US" sz="1600" dirty="0" err="1" smtClean="0"/>
-              <a:t>Cor</a:t>
-            </a:r>
-            <a:r>
-              <a:rPr lang="en-US" sz="1600" dirty="0" smtClean="0"/>
-              <a:t> </a:t>
-            </a:r>
-            <a:r>
-              <a:rPr lang="en-US" sz="1600" dirty="0" err="1" smtClean="0"/>
-              <a:t>trocada</a:t>
-            </a:r>
-            <a:endParaRPr lang="en-US" sz="1600" dirty="0" smtClean="0"/>
-          </a:p>
-          <a:p>
-            <a:pPr>
-              <a:buFontTx/>
-              <a:buNone/>
-            </a:pPr>
-            <a:endParaRPr lang="en-US" sz="1600" dirty="0" smtClean="0"/>
-          </a:p>
-          <a:p>
-            <a:pPr>
-              <a:buFontTx/>
-              <a:buNone/>
-            </a:pPr>
-            <a:r>
-              <a:rPr lang="en-US" sz="1600" dirty="0" err="1" smtClean="0"/>
-              <a:t>Checar</a:t>
-            </a:r>
-            <a:r>
-              <a:rPr lang="en-US" sz="1600" dirty="0" smtClean="0"/>
-              <a:t> POW</a:t>
-            </a:r>
-          </a:p>
-          <a:p>
-            <a:pPr>
-              <a:buFontTx/>
-              <a:buNone/>
-            </a:pPr>
-            <a:endParaRPr lang="en-US" sz="1600" dirty="0" smtClean="0"/>
-          </a:p>
-          <a:p>
-            <a:pPr>
-              <a:buFontTx/>
-              <a:buNone/>
-            </a:pPr>
-            <a:r>
-              <a:rPr lang="en-US" sz="1600" dirty="0" smtClean="0"/>
-              <a:t>	</a:t>
-            </a:r>
-          </a:p>
-          <a:p>
-            <a:pPr>
-              <a:buFontTx/>
-              <a:buNone/>
-            </a:pPr>
-            <a:r>
-              <a:rPr lang="en-US" sz="1600" dirty="0" smtClean="0"/>
-              <a:t>	</a:t>
-            </a:r>
-          </a:p>
-          <a:p>
-            <a:pPr>
-              <a:buFontTx/>
-              <a:buNone/>
-            </a:pPr>
-            <a:endParaRPr lang="pt-BR" sz="1600" dirty="0"/>
-          </a:p>
-        </p:txBody>
-      </p:sp>
-    </p:spTree>
-  </p:cSld>
-  <p:clrMapOvr>
-    <a:masterClrMapping/>
-  </p:clrMapOvr>
-  <p:timing>
-    <p:tnLst>
-      <p:par>
-        <p:cTn id="1" dur="indefinite" restart="never" nodeType="tmRoot"/>
-      </p:par>
-    </p:tnLst>
-  </p:timing>
-</p:sld>
-</file>
-
 <file path=ppt/slides/slide3.xml><?xml version="1.0" encoding="utf-8"?>
 <p:sld xmlns:a="http://schemas.openxmlformats.org/drawingml/2006/main" xmlns:r="http://schemas.openxmlformats.org/officeDocument/2006/relationships" xmlns:p="http://schemas.openxmlformats.org/presentationml/2006/main">
   <p:cSld>
@@ -16296,7 +15600,7 @@
             <a:fld id="{DE754126-A5A6-4D01-9F3F-5D1F1DA4553D}" type="datetime1">
               <a:rPr lang="pt-BR"/>
               <a:pPr/>
-              <a:t>06/03/2014</a:t>
+              <a:t>22/05/2014</a:t>
             </a:fld>
             <a:endParaRPr lang="pt-BR"/>
           </a:p>
@@ -16345,9 +15649,30 @@
           <a:lstStyle/>
           <a:p>
             <a:r>
-              <a:rPr lang="en-US"/>
-              <a:t>Conjunto de registradores do uPICMC</a:t>
-            </a:r>
+              <a:rPr lang="en-US" dirty="0" err="1"/>
+              <a:t>Conjunto</a:t>
+            </a:r>
+            <a:r>
+              <a:rPr lang="en-US" dirty="0"/>
+              <a:t> de </a:t>
+            </a:r>
+            <a:r>
+              <a:rPr lang="en-US" dirty="0" err="1"/>
+              <a:t>registradores</a:t>
+            </a:r>
+            <a:r>
+              <a:rPr lang="en-US" dirty="0"/>
+              <a:t> do </a:t>
+            </a:r>
+            <a:r>
+              <a:rPr lang="en-US" dirty="0" err="1" smtClean="0"/>
+              <a:t>uP</a:t>
+            </a:r>
+            <a:r>
+              <a:rPr lang="en-US" dirty="0" smtClean="0"/>
+              <a:t> ICMC</a:t>
+            </a:r>
+            <a:endParaRPr lang="en-US" dirty="0"/>
           </a:p>
         </p:txBody>
       </p:sp>
@@ -18380,6 +17705,226 @@
           </a:graphicData>
         </a:graphic>
       </p:graphicFrame>
+      <p:sp>
+        <p:nvSpPr>
+          <p:cNvPr id="7" name="Rectangle 5"/>
+          <p:cNvSpPr txBox="1">
+            <a:spLocks noChangeArrowheads="1"/>
+          </p:cNvSpPr>
+          <p:nvPr/>
+        </p:nvSpPr>
+        <p:spPr bwMode="auto">
+          <a:xfrm>
+            <a:off x="1331913" y="4725144"/>
+            <a:ext cx="6400800" cy="1486744"/>
+          </a:xfrm>
+          <a:prstGeom prst="rect">
+            <a:avLst/>
+          </a:prstGeom>
+          <a:noFill/>
+          <a:ln w="9525">
+            <a:noFill/>
+            <a:miter lim="800000"/>
+            <a:headEnd/>
+            <a:tailEnd/>
+          </a:ln>
+          <a:effectLst/>
+        </p:spPr>
+        <p:txBody>
+          <a:bodyPr vert="horz" wrap="square" lIns="91440" tIns="45720" rIns="91440" bIns="45720" numCol="1" anchor="t" anchorCtr="0" compatLnSpc="1">
+            <a:prstTxWarp prst="textNoShape">
+              <a:avLst/>
+            </a:prstTxWarp>
+          </a:bodyPr>
+          <a:lstStyle>
+            <a:lvl1pPr marL="342900" indent="-342900" algn="l" rtl="0" fontAlgn="base">
+              <a:spcBef>
+                <a:spcPct val="20000"/>
+              </a:spcBef>
+              <a:spcAft>
+                <a:spcPct val="0"/>
+              </a:spcAft>
+              <a:buChar char="•"/>
+              <a:defRPr sz="2800">
+                <a:solidFill>
+                  <a:schemeClr val="tx1"/>
+                </a:solidFill>
+                <a:latin typeface="+mn-lt"/>
+                <a:ea typeface="+mn-ea"/>
+                <a:cs typeface="+mn-cs"/>
+              </a:defRPr>
+            </a:lvl1pPr>
+            <a:lvl2pPr marL="742950" indent="-285750" algn="l" rtl="0" fontAlgn="base">
+              <a:spcBef>
+                <a:spcPct val="20000"/>
+              </a:spcBef>
+              <a:spcAft>
+                <a:spcPct val="0"/>
+              </a:spcAft>
+              <a:buChar char="–"/>
+              <a:defRPr sz="2400">
+                <a:solidFill>
+                  <a:schemeClr val="tx1"/>
+                </a:solidFill>
+                <a:latin typeface="+mn-lt"/>
+                <a:cs typeface="+mn-cs"/>
+              </a:defRPr>
+            </a:lvl2pPr>
+            <a:lvl3pPr marL="1143000" indent="-228600" algn="l" rtl="0" fontAlgn="base">
+              <a:spcBef>
+                <a:spcPct val="20000"/>
+              </a:spcBef>
+              <a:spcAft>
+                <a:spcPct val="0"/>
+              </a:spcAft>
+              <a:buChar char="•"/>
+              <a:defRPr sz="2000">
+                <a:solidFill>
+                  <a:schemeClr val="tx1"/>
+                </a:solidFill>
+                <a:latin typeface="+mn-lt"/>
+                <a:cs typeface="+mn-cs"/>
+              </a:defRPr>
+            </a:lvl3pPr>
+            <a:lvl4pPr marL="1600200" indent="-228600" algn="l" rtl="0" fontAlgn="base">
+              <a:spcBef>
+                <a:spcPct val="20000"/>
+              </a:spcBef>
+              <a:spcAft>
+                <a:spcPct val="0"/>
+              </a:spcAft>
+              <a:buChar char="–"/>
+              <a:defRPr sz="2000">
+                <a:solidFill>
+                  <a:schemeClr val="tx1"/>
+                </a:solidFill>
+                <a:latin typeface="+mn-lt"/>
+                <a:cs typeface="+mn-cs"/>
+              </a:defRPr>
+            </a:lvl4pPr>
+            <a:lvl5pPr marL="2057400" indent="-228600" algn="l" rtl="0" fontAlgn="base">
+              <a:spcBef>
+                <a:spcPct val="20000"/>
+              </a:spcBef>
+              <a:spcAft>
+                <a:spcPct val="0"/>
+              </a:spcAft>
+              <a:buChar char="»"/>
+              <a:defRPr sz="2000">
+                <a:solidFill>
+                  <a:schemeClr val="tx1"/>
+                </a:solidFill>
+                <a:latin typeface="+mn-lt"/>
+                <a:cs typeface="+mn-cs"/>
+              </a:defRPr>
+            </a:lvl5pPr>
+            <a:lvl6pPr marL="2514600" indent="-228600" algn="l" rtl="0" fontAlgn="base">
+              <a:spcBef>
+                <a:spcPct val="20000"/>
+              </a:spcBef>
+              <a:spcAft>
+                <a:spcPct val="0"/>
+              </a:spcAft>
+              <a:buChar char="»"/>
+              <a:defRPr sz="2000">
+                <a:solidFill>
+                  <a:schemeClr val="tx1"/>
+                </a:solidFill>
+                <a:latin typeface="+mn-lt"/>
+                <a:cs typeface="+mn-cs"/>
+              </a:defRPr>
+            </a:lvl6pPr>
+            <a:lvl7pPr marL="2971800" indent="-228600" algn="l" rtl="0" fontAlgn="base">
+              <a:spcBef>
+                <a:spcPct val="20000"/>
+              </a:spcBef>
+              <a:spcAft>
+                <a:spcPct val="0"/>
+              </a:spcAft>
+              <a:buChar char="»"/>
+              <a:defRPr sz="2000">
+                <a:solidFill>
+                  <a:schemeClr val="tx1"/>
+                </a:solidFill>
+                <a:latin typeface="+mn-lt"/>
+                <a:cs typeface="+mn-cs"/>
+              </a:defRPr>
+            </a:lvl7pPr>
+            <a:lvl8pPr marL="3429000" indent="-228600" algn="l" rtl="0" fontAlgn="base">
+              <a:spcBef>
+                <a:spcPct val="20000"/>
+              </a:spcBef>
+              <a:spcAft>
+                <a:spcPct val="0"/>
+              </a:spcAft>
+              <a:buChar char="»"/>
+              <a:defRPr sz="2000">
+                <a:solidFill>
+                  <a:schemeClr val="tx1"/>
+                </a:solidFill>
+                <a:latin typeface="+mn-lt"/>
+                <a:cs typeface="+mn-cs"/>
+              </a:defRPr>
+            </a:lvl8pPr>
+            <a:lvl9pPr marL="3886200" indent="-228600" algn="l" rtl="0" fontAlgn="base">
+              <a:spcBef>
+                <a:spcPct val="20000"/>
+              </a:spcBef>
+              <a:spcAft>
+                <a:spcPct val="0"/>
+              </a:spcAft>
+              <a:buChar char="»"/>
+              <a:defRPr sz="2000">
+                <a:solidFill>
+                  <a:schemeClr val="tx1"/>
+                </a:solidFill>
+                <a:latin typeface="+mn-lt"/>
+                <a:cs typeface="+mn-cs"/>
+              </a:defRPr>
+            </a:lvl9pPr>
+          </a:lstStyle>
+          <a:p>
+            <a:r>
+              <a:rPr lang="en-US" dirty="0" err="1" smtClean="0"/>
+              <a:t>Arquitetura</a:t>
+            </a:r>
+            <a:r>
+              <a:rPr lang="en-US" dirty="0" smtClean="0"/>
+              <a:t> RISC do </a:t>
+            </a:r>
+            <a:r>
+              <a:rPr lang="en-US" dirty="0" err="1" smtClean="0"/>
+              <a:t>tipo</a:t>
+            </a:r>
+            <a:r>
+              <a:rPr lang="en-US" dirty="0" smtClean="0"/>
+              <a:t> Load/Store</a:t>
+            </a:r>
+          </a:p>
+          <a:p>
+            <a:r>
+              <a:rPr lang="en-US" dirty="0" err="1" smtClean="0"/>
+              <a:t>Operações</a:t>
+            </a:r>
+            <a:r>
+              <a:rPr lang="en-US" dirty="0" smtClean="0"/>
+              <a:t> de Reg. </a:t>
+            </a:r>
+            <a:r>
+              <a:rPr lang="en-US" dirty="0" err="1" smtClean="0"/>
+              <a:t>para</a:t>
+            </a:r>
+            <a:r>
+              <a:rPr lang="en-US" dirty="0" smtClean="0"/>
+              <a:t> Reg.</a:t>
+            </a:r>
+            <a:endParaRPr lang="pt-BR" dirty="0" smtClean="0"/>
+          </a:p>
+          <a:p>
+            <a:endParaRPr lang="pt-BR" dirty="0"/>
+          </a:p>
+        </p:txBody>
+      </p:sp>
     </p:spTree>
   </p:cSld>
   <p:clrMapOvr>
@@ -18431,7 +17976,7 @@
             <a:fld id="{8E5B25A1-534F-4580-A142-CB4EDC6DDAC3}" type="datetime1">
               <a:rPr lang="pt-BR"/>
               <a:pPr/>
-              <a:t>06/03/2014</a:t>
+              <a:t>22/05/2014</a:t>
             </a:fld>
             <a:endParaRPr lang="pt-BR" dirty="0"/>
           </a:p>
@@ -20875,7 +20420,7 @@
             <a:fld id="{421DDD7C-2702-4676-B961-CFED1FEDC58A}" type="datetime1">
               <a:rPr lang="pt-BR"/>
               <a:pPr/>
-              <a:t>06/03/2014</a:t>
+              <a:t>22/05/2014</a:t>
             </a:fld>
             <a:endParaRPr lang="pt-BR"/>
           </a:p>
@@ -20958,7 +20503,15 @@
             </a:pPr>
             <a:r>
               <a:rPr lang="pt-BR" sz="1600" dirty="0"/>
-              <a:t>	STORE END RX 	MEM(END) &lt;- RX	 	110001 | RX | xxx | xxx | x</a:t>
+              <a:t>	STORE </a:t>
+            </a:r>
+            <a:r>
+              <a:rPr lang="pt-BR" sz="1600" dirty="0" smtClean="0"/>
+              <a:t>END, </a:t>
+            </a:r>
+            <a:r>
+              <a:rPr lang="pt-BR" sz="1600" dirty="0"/>
+              <a:t>RX 	MEM(END) &lt;- RX	 	110001 | RX | xxx | xxx | x</a:t>
             </a:r>
           </a:p>
           <a:p>
@@ -20978,7 +20531,15 @@
             </a:pPr>
             <a:r>
               <a:rPr lang="pt-BR" sz="1600" dirty="0"/>
-              <a:t>	LOAD RX END		RX &lt;- MEM(END)		110000 | RX | xxx | xxx | x</a:t>
+              <a:t>	LOAD </a:t>
+            </a:r>
+            <a:r>
+              <a:rPr lang="pt-BR" sz="1600" dirty="0" smtClean="0"/>
+              <a:t>RX, </a:t>
+            </a:r>
+            <a:r>
+              <a:rPr lang="pt-BR" sz="1600" dirty="0"/>
+              <a:t>END		RX &lt;- MEM(END)		110000 | RX | xxx | xxx | x</a:t>
             </a:r>
           </a:p>
           <a:p>
@@ -21013,7 +20574,15 @@
             </a:r>
             <a:r>
               <a:rPr lang="pt-BR" sz="1600" dirty="0" smtClean="0"/>
-              <a:t>STOREI RX RY </a:t>
+              <a:t>STOREI </a:t>
+            </a:r>
+            <a:r>
+              <a:rPr lang="pt-BR" sz="1600" dirty="0" smtClean="0"/>
+              <a:t>RX, </a:t>
+            </a:r>
+            <a:r>
+              <a:rPr lang="pt-BR" sz="1600" dirty="0" smtClean="0"/>
+              <a:t>RY </a:t>
             </a:r>
             <a:r>
               <a:rPr lang="pt-BR" sz="1600" dirty="0"/>
@@ -21050,8 +20619,12 @@
               <a:t>LOADI </a:t>
             </a:r>
             <a:r>
+              <a:rPr lang="pt-BR" sz="1600" dirty="0" smtClean="0"/>
+              <a:t>RX, </a:t>
+            </a:r>
+            <a:r>
               <a:rPr lang="pt-BR" sz="1600" dirty="0"/>
-              <a:t>RX RY		RX &lt;- MEM(RY)		111100 | RX | RY | xxx | </a:t>
+              <a:t>RY		RX &lt;- MEM(RY)		111100 | RX | RY | xxx | </a:t>
             </a:r>
             <a:r>
               <a:rPr lang="pt-BR" sz="1600" dirty="0" smtClean="0"/>
@@ -21086,13 +20659,16 @@
             </a:pPr>
             <a:r>
               <a:rPr lang="pt-BR" sz="1600" dirty="0" smtClean="0"/>
-              <a:t>	LOADN RX #NR	RX &lt;- NR			111000 | RX | xxx | xxx | </a:t>
+              <a:t>	LOADN </a:t>
             </a:r>
             <a:r>
               <a:rPr lang="pt-BR" sz="1600" dirty="0" smtClean="0"/>
-              <a:t>x</a:t>
-            </a:r>
-            <a:endParaRPr lang="pt-BR" sz="1600" dirty="0" smtClean="0"/>
+              <a:t>RX, </a:t>
+            </a:r>
+            <a:r>
+              <a:rPr lang="pt-BR" sz="1600" dirty="0" smtClean="0"/>
+              <a:t>#NR	RX &lt;- NR			111000 | RX | xxx | xxx | x</a:t>
+            </a:r>
           </a:p>
           <a:p>
             <a:pPr>
@@ -21125,7 +20701,15 @@
             </a:pPr>
             <a:r>
               <a:rPr lang="pt-BR" sz="1600" dirty="0" smtClean="0"/>
-              <a:t>	MOV RX RY		RX &lt;- RY			111100 | RX | RY | xx | x0</a:t>
+              <a:t>	MOV </a:t>
+            </a:r>
+            <a:r>
+              <a:rPr lang="pt-BR" sz="1600" dirty="0" smtClean="0"/>
+              <a:t>RX, </a:t>
+            </a:r>
+            <a:r>
+              <a:rPr lang="pt-BR" sz="1600" dirty="0" smtClean="0"/>
+              <a:t>RY		RX &lt;- RY			111100 | RX | RY | xx | x0</a:t>
             </a:r>
           </a:p>
           <a:p>
@@ -21134,7 +20718,15 @@
             </a:pPr>
             <a:r>
               <a:rPr lang="pt-BR" sz="1600" dirty="0" smtClean="0"/>
-              <a:t>	MOV RX SP		RX &lt;- SP			111100 | RX | xxx | xx | 01</a:t>
+              <a:t>	MOV </a:t>
+            </a:r>
+            <a:r>
+              <a:rPr lang="pt-BR" sz="1600" dirty="0" smtClean="0"/>
+              <a:t>RX, </a:t>
+            </a:r>
+            <a:r>
+              <a:rPr lang="pt-BR" sz="1600" dirty="0" smtClean="0"/>
+              <a:t>SP		RX &lt;- SP			111100 | RX | xxx | xx | 01</a:t>
             </a:r>
           </a:p>
           <a:p>
@@ -21143,7 +20735,15 @@
             </a:pPr>
             <a:r>
               <a:rPr lang="pt-BR" sz="1600" dirty="0" smtClean="0"/>
-              <a:t>	MOV SP RX		SP &lt;- RX			111100 | RX | </a:t>
+              <a:t>	MOV </a:t>
+            </a:r>
+            <a:r>
+              <a:rPr lang="pt-BR" sz="1600" dirty="0" smtClean="0"/>
+              <a:t>SP, </a:t>
+            </a:r>
+            <a:r>
+              <a:rPr lang="pt-BR" sz="1600" dirty="0" smtClean="0"/>
+              <a:t>RX		SP &lt;- RX			111100 | RX | </a:t>
             </a:r>
             <a:r>
               <a:rPr lang="pt-BR" sz="1600" dirty="0" err="1" smtClean="0"/>
@@ -21227,7 +20827,7 @@
             <a:fld id="{8E5B25A1-534F-4580-A142-CB4EDC6DDAC3}" type="datetime1">
               <a:rPr lang="pt-BR"/>
               <a:pPr/>
-              <a:t>06/03/2014</a:t>
+              <a:t>22/05/2014</a:t>
             </a:fld>
             <a:endParaRPr lang="pt-BR"/>
           </a:p>
@@ -22071,7 +21671,7 @@
             <a:fld id="{E1241BDD-23C8-4726-B5AD-CD9D7674C894}" type="datetime1">
               <a:rPr lang="pt-BR"/>
               <a:pPr/>
-              <a:t>06/03/2014</a:t>
+              <a:t>22/05/2014</a:t>
             </a:fld>
             <a:endParaRPr lang="pt-BR"/>
           </a:p>
@@ -22133,8 +21733,8 @@
         </p:nvSpPr>
         <p:spPr bwMode="auto">
           <a:xfrm>
-            <a:off x="684213" y="1531938"/>
-            <a:ext cx="8229600" cy="4895850"/>
+            <a:off x="251520" y="1531938"/>
+            <a:ext cx="8662293" cy="4895850"/>
           </a:xfrm>
           <a:prstGeom prst="rect">
             <a:avLst/>
@@ -22166,16 +21766,8 @@
               <a:t>ADD </a:t>
             </a:r>
             <a:r>
-              <a:rPr lang="pt-BR" sz="1600" dirty="0"/>
-              <a:t>RX RY </a:t>
-            </a:r>
-            <a:r>
               <a:rPr lang="pt-BR" sz="1600" dirty="0" smtClean="0"/>
-              <a:t>RZ</a:t>
-            </a:r>
-            <a:r>
-              <a:rPr lang="pt-BR" sz="1600" dirty="0"/>
-              <a:t>	</a:t>
+              <a:t>RX, RY, RZ</a:t>
             </a:r>
             <a:r>
               <a:rPr lang="pt-BR" sz="1600" dirty="0" smtClean="0"/>
@@ -22198,7 +21790,11 @@
             </a:r>
             <a:r>
               <a:rPr lang="pt-BR" sz="1600" dirty="0" smtClean="0"/>
-              <a:t>RX RY RZ </a:t>
+              <a:t>RX, RY, </a:t>
+            </a:r>
+            <a:r>
+              <a:rPr lang="pt-BR" sz="1600" dirty="0" smtClean="0"/>
+              <a:t>RZ </a:t>
             </a:r>
             <a:r>
               <a:rPr lang="pt-BR" sz="1600" dirty="0"/>
@@ -22236,11 +21832,11 @@
             </a:r>
             <a:r>
               <a:rPr lang="pt-BR" sz="1600" dirty="0" smtClean="0"/>
-              <a:t>RX RY RZ </a:t>
+              <a:t>RX, RY, RZ</a:t>
             </a:r>
             <a:r>
               <a:rPr lang="pt-BR" sz="1600" dirty="0"/>
-              <a:t>		</a:t>
+              <a:t>	</a:t>
             </a:r>
             <a:r>
               <a:rPr lang="pt-BR" sz="1600" dirty="0" smtClean="0"/>
@@ -22263,7 +21859,11 @@
             </a:r>
             <a:r>
               <a:rPr lang="pt-BR" sz="1600" dirty="0" smtClean="0"/>
-              <a:t>RX RY RZ </a:t>
+              <a:t>RX, RY, </a:t>
+            </a:r>
+            <a:r>
+              <a:rPr lang="pt-BR" sz="1600" dirty="0" smtClean="0"/>
+              <a:t>RZ </a:t>
             </a:r>
             <a:r>
               <a:rPr lang="pt-BR" sz="1600" dirty="0"/>
@@ -22298,7 +21898,11 @@
             </a:r>
             <a:r>
               <a:rPr lang="pt-BR" sz="1600" dirty="0" smtClean="0"/>
-              <a:t>RX RY RZ </a:t>
+              <a:t>RX, RY, </a:t>
+            </a:r>
+            <a:r>
+              <a:rPr lang="pt-BR" sz="1600" dirty="0" smtClean="0"/>
+              <a:t>RZ </a:t>
             </a:r>
             <a:r>
               <a:rPr lang="pt-BR" sz="1600" dirty="0"/>
@@ -22325,7 +21929,11 @@
             </a:r>
             <a:r>
               <a:rPr lang="pt-BR" sz="1600" dirty="0" smtClean="0"/>
-              <a:t>RX RY RZ </a:t>
+              <a:t>RX, RY, </a:t>
+            </a:r>
+            <a:r>
+              <a:rPr lang="pt-BR" sz="1600" dirty="0" smtClean="0"/>
+              <a:t>RZ </a:t>
             </a:r>
             <a:r>
               <a:rPr lang="pt-BR" sz="1600" dirty="0"/>
@@ -22360,7 +21968,11 @@
             </a:r>
             <a:r>
               <a:rPr lang="pt-BR" sz="1600" dirty="0" smtClean="0"/>
-              <a:t>RX RY RZ </a:t>
+              <a:t>RX, RY, </a:t>
+            </a:r>
+            <a:r>
+              <a:rPr lang="pt-BR" sz="1600" dirty="0" smtClean="0"/>
+              <a:t>RZ </a:t>
             </a:r>
             <a:r>
               <a:rPr lang="pt-BR" sz="1600" dirty="0"/>
@@ -22387,7 +21999,11 @@
             </a:r>
             <a:r>
               <a:rPr lang="pt-BR" sz="1600" dirty="0" smtClean="0"/>
-              <a:t>RX RY RZ </a:t>
+              <a:t>RX, RY, </a:t>
+            </a:r>
+            <a:r>
+              <a:rPr lang="pt-BR" sz="1600" dirty="0" smtClean="0"/>
+              <a:t>RZ </a:t>
             </a:r>
             <a:r>
               <a:rPr lang="pt-BR" sz="1600" dirty="0"/>
@@ -22509,7 +22125,15 @@
             </a:pPr>
             <a:r>
               <a:rPr lang="en-US" sz="1600" dirty="0" smtClean="0"/>
-              <a:t>	MOD RX RY RZ		RX&lt;-RY MOD RZ		100101 | RX | RY | RZ | x</a:t>
+              <a:t>	MOD </a:t>
+            </a:r>
+            <a:r>
+              <a:rPr lang="en-US" sz="1600" dirty="0" smtClean="0"/>
+              <a:t>RX, RY, RZ</a:t>
+            </a:r>
+            <a:r>
+              <a:rPr lang="en-US" sz="1600" dirty="0" smtClean="0"/>
+              <a:t>	RX&lt;-RY MOD RZ		100101 | RX | RY | RZ | x</a:t>
             </a:r>
             <a:endParaRPr lang="pt-BR" sz="1600" dirty="0"/>
           </a:p>
@@ -22581,7 +22205,7 @@
             <a:fld id="{10D23789-7983-4856-BB76-C62241C94769}" type="datetime1">
               <a:rPr lang="pt-BR"/>
               <a:pPr/>
-              <a:t>06/03/2014</a:t>
+              <a:t>22/05/2014</a:t>
             </a:fld>
             <a:endParaRPr lang="pt-BR"/>
           </a:p>
@@ -22673,7 +22297,7 @@
             </a:r>
             <a:r>
               <a:rPr lang="pt-BR" sz="1600" dirty="0" smtClean="0"/>
-              <a:t>RX RY RZ 	</a:t>
+              <a:t>RX, RY, RZ</a:t>
             </a:r>
             <a:r>
               <a:rPr lang="pt-BR" sz="1600" dirty="0"/>
@@ -22708,7 +22332,11 @@
             </a:r>
             <a:r>
               <a:rPr lang="pt-BR" sz="1600" dirty="0" smtClean="0"/>
-              <a:t>RX RY RZ </a:t>
+              <a:t>RX, RY, </a:t>
+            </a:r>
+            <a:r>
+              <a:rPr lang="pt-BR" sz="1600" dirty="0" smtClean="0"/>
+              <a:t>RZ </a:t>
             </a:r>
             <a:r>
               <a:rPr lang="pt-BR" sz="1600" dirty="0"/>
@@ -22743,7 +22371,11 @@
             </a:r>
             <a:r>
               <a:rPr lang="pt-BR" sz="1600" dirty="0" smtClean="0"/>
-              <a:t>RX RY RZ 	RX&lt;-RY </a:t>
+              <a:t>RX, RY, </a:t>
+            </a:r>
+            <a:r>
+              <a:rPr lang="pt-BR" sz="1600" dirty="0" smtClean="0"/>
+              <a:t>RZ 	RX&lt;-RY </a:t>
             </a:r>
             <a:r>
               <a:rPr lang="pt-BR" sz="1600" dirty="0"/>
@@ -22778,7 +22410,11 @@
             </a:r>
             <a:r>
               <a:rPr lang="pt-BR" sz="1600" dirty="0" smtClean="0"/>
-              <a:t>RX RY</a:t>
+              <a:t>RX, </a:t>
+            </a:r>
+            <a:r>
+              <a:rPr lang="pt-BR" sz="1600" dirty="0" smtClean="0"/>
+              <a:t>RY</a:t>
             </a:r>
             <a:r>
               <a:rPr lang="pt-BR" sz="1600" dirty="0"/>
@@ -23048,7 +22684,15 @@
             </a:pPr>
             <a:r>
               <a:rPr lang="pt-BR" sz="1600" dirty="0" smtClean="0"/>
-              <a:t>	CMP RX RY 		FR&lt;-COND	 	000101 | RX | RY | xxx | x</a:t>
+              <a:t>	CMP </a:t>
+            </a:r>
+            <a:r>
+              <a:rPr lang="pt-BR" sz="1600" dirty="0" smtClean="0"/>
+              <a:t>RX, </a:t>
+            </a:r>
+            <a:r>
+              <a:rPr lang="pt-BR" sz="1600" dirty="0" smtClean="0"/>
+              <a:t>RY 		FR&lt;-COND	 	000101 | RX | RY | xxx | x</a:t>
             </a:r>
             <a:endParaRPr lang="pt-BR" sz="1600" dirty="0"/>
           </a:p>
@@ -23131,7 +22775,7 @@
             <a:fld id="{8E9BCB67-FD7E-42A2-B458-F658D16F45B7}" type="datetime1">
               <a:rPr lang="pt-BR"/>
               <a:pPr/>
-              <a:t>06/03/2014</a:t>
+              <a:t>22/05/2014</a:t>
             </a:fld>
             <a:endParaRPr lang="pt-BR"/>
           </a:p>

</xml_diff>